<commit_message>
The system is now operational.
</commit_message>
<xml_diff>
--- a/Nody Presentation.pptx
+++ b/Nody Presentation.pptx
@@ -21851,7 +21851,7 @@
                 <a16:creationId xmlns:a16="http://schemas.microsoft.com/office/drawing/2014/main" id="{7EF238CB-AB58-4787-8F9C-A1C16929A2FA}"/>
               </a:ext>
               <a:ext uri="{C183D7F6-B498-43B3-948B-1728B52AA6E4}">
-                <adec:decorative xmlns:adec="http://schemas.microsoft.com/office/drawing/2017/decorative" xmlns="" val="1"/>
+                <adec:decorative xmlns="" xmlns:adec="http://schemas.microsoft.com/office/drawing/2017/decorative" val="1"/>
               </a:ext>
             </a:extLst>
           </p:cNvPr>
@@ -22083,7 +22083,7 @@
                 <a16:creationId xmlns:a16="http://schemas.microsoft.com/office/drawing/2014/main" id="{545D50A1-D634-4325-B06C-5450FDF7B818}"/>
               </a:ext>
               <a:ext uri="{C183D7F6-B498-43B3-948B-1728B52AA6E4}">
-                <adec:decorative xmlns:adec="http://schemas.microsoft.com/office/drawing/2017/decorative" xmlns="" val="1"/>
+                <adec:decorative xmlns="" xmlns:adec="http://schemas.microsoft.com/office/drawing/2017/decorative" val="1"/>
               </a:ext>
             </a:extLst>
           </p:cNvPr>
@@ -22147,6 +22147,25 @@
   <p:clrMapOvr>
     <a:masterClrMapping/>
   </p:clrMapOvr>
+  <mc:AlternateContent xmlns:mc="http://schemas.openxmlformats.org/markup-compatibility/2006">
+    <mc:Choice xmlns:p14="http://schemas.microsoft.com/office/powerpoint/2010/main" Requires="p14">
+      <p:transition spd="slow" p14:dur="4400">
+        <p14:honeycomb/>
+      </p:transition>
+    </mc:Choice>
+    <mc:Fallback>
+      <p:transition spd="slow">
+        <p:fade/>
+      </p:transition>
+    </mc:Fallback>
+  </mc:AlternateContent>
+  <p:timing>
+    <p:tnLst>
+      <p:par>
+        <p:cTn id="1" dur="indefinite" restart="never" nodeType="tmRoot"/>
+      </p:par>
+    </p:tnLst>
+  </p:timing>
 </p:sld>
 </file>
 
@@ -22315,7 +22334,7 @@
                 <a16:creationId xmlns:a16="http://schemas.microsoft.com/office/drawing/2014/main" id="{764DA446-807B-4C83-BB5A-59E3FABC93F3}"/>
               </a:ext>
               <a:ext uri="{C183D7F6-B498-43B3-948B-1728B52AA6E4}">
-                <adec:decorative xmlns:adec="http://schemas.microsoft.com/office/drawing/2017/decorative" xmlns="" val="1"/>
+                <adec:decorative xmlns="" xmlns:adec="http://schemas.microsoft.com/office/drawing/2017/decorative" val="1"/>
               </a:ext>
             </a:extLst>
           </p:cNvPr>
@@ -22505,7 +22524,7 @@
                 <a16:creationId xmlns:a16="http://schemas.microsoft.com/office/drawing/2014/main" id="{F28CDBF8-0191-43F9-98FE-B98B08813979}"/>
               </a:ext>
               <a:ext uri="{C183D7F6-B498-43B3-948B-1728B52AA6E4}">
-                <adec:decorative xmlns:adec="http://schemas.microsoft.com/office/drawing/2017/decorative" xmlns="" val="1"/>
+                <adec:decorative xmlns="" xmlns:adec="http://schemas.microsoft.com/office/drawing/2017/decorative" val="1"/>
               </a:ext>
             </a:extLst>
           </p:cNvPr>
@@ -22726,6 +22745,25 @@
   <p:clrMapOvr>
     <a:masterClrMapping/>
   </p:clrMapOvr>
+  <mc:AlternateContent xmlns:mc="http://schemas.openxmlformats.org/markup-compatibility/2006">
+    <mc:Choice xmlns:p14="http://schemas.microsoft.com/office/powerpoint/2010/main" Requires="p14">
+      <p:transition spd="slow" p14:dur="4400">
+        <p14:honeycomb/>
+      </p:transition>
+    </mc:Choice>
+    <mc:Fallback>
+      <p:transition spd="slow">
+        <p:fade/>
+      </p:transition>
+    </mc:Fallback>
+  </mc:AlternateContent>
+  <p:timing>
+    <p:tnLst>
+      <p:par>
+        <p:cTn id="1" dur="indefinite" restart="never" nodeType="tmRoot"/>
+      </p:par>
+    </p:tnLst>
+  </p:timing>
 </p:sld>
 </file>
 
@@ -22806,11 +22844,7 @@
             </a:pPr>
             <a:r>
               <a:rPr lang="en-ZA" sz="2800" dirty="0" smtClean="0"/>
-              <a:t>The syste</a:t>
-            </a:r>
-            <a:r>
-              <a:rPr lang="en-ZA" sz="2800" dirty="0" smtClean="0"/>
-              <a:t>m consists of:</a:t>
+              <a:t>The system consists of:</a:t>
             </a:r>
             <a:endParaRPr lang="en-ZA" sz="2800" dirty="0"/>
           </a:p>
@@ -22898,7 +22932,7 @@
                 <a16:creationId xmlns:a16="http://schemas.microsoft.com/office/drawing/2014/main" id="{3EEE5409-3F6C-485D-B4C2-5247917F1018}"/>
               </a:ext>
               <a:ext uri="{C183D7F6-B498-43B3-948B-1728B52AA6E4}">
-                <adec:decorative xmlns:adec="http://schemas.microsoft.com/office/drawing/2017/decorative" xmlns="" val="1"/>
+                <adec:decorative xmlns="" xmlns:adec="http://schemas.microsoft.com/office/drawing/2017/decorative" val="1"/>
               </a:ext>
             </a:extLst>
           </p:cNvPr>
@@ -23085,7 +23119,7 @@
                 <a16:creationId xmlns:a16="http://schemas.microsoft.com/office/drawing/2014/main" id="{0D74D4D5-6A4C-4248-8A92-B8CA1C918EB6}"/>
               </a:ext>
               <a:ext uri="{C183D7F6-B498-43B3-948B-1728B52AA6E4}">
-                <adec:decorative xmlns:adec="http://schemas.microsoft.com/office/drawing/2017/decorative" xmlns="" val="1"/>
+                <adec:decorative xmlns="" xmlns:adec="http://schemas.microsoft.com/office/drawing/2017/decorative" val="1"/>
               </a:ext>
             </a:extLst>
           </p:cNvPr>
@@ -23304,6 +23338,25 @@
   <p:clrMapOvr>
     <a:masterClrMapping/>
   </p:clrMapOvr>
+  <mc:AlternateContent xmlns:mc="http://schemas.openxmlformats.org/markup-compatibility/2006">
+    <mc:Choice xmlns:p14="http://schemas.microsoft.com/office/powerpoint/2010/main" Requires="p14">
+      <p:transition spd="slow" p14:dur="4400">
+        <p14:honeycomb/>
+      </p:transition>
+    </mc:Choice>
+    <mc:Fallback>
+      <p:transition spd="slow">
+        <p:fade/>
+      </p:transition>
+    </mc:Fallback>
+  </mc:AlternateContent>
+  <p:timing>
+    <p:tnLst>
+      <p:par>
+        <p:cTn id="1" dur="indefinite" restart="never" nodeType="tmRoot"/>
+      </p:par>
+    </p:tnLst>
+  </p:timing>
 </p:sld>
 </file>
 
@@ -23552,6 +23605,25 @@
   <p:clrMapOvr>
     <a:masterClrMapping/>
   </p:clrMapOvr>
+  <mc:AlternateContent xmlns:mc="http://schemas.openxmlformats.org/markup-compatibility/2006">
+    <mc:Choice xmlns:p14="http://schemas.microsoft.com/office/powerpoint/2010/main" Requires="p14">
+      <p:transition spd="slow" p14:dur="4400">
+        <p14:honeycomb/>
+      </p:transition>
+    </mc:Choice>
+    <mc:Fallback>
+      <p:transition spd="slow">
+        <p:fade/>
+      </p:transition>
+    </mc:Fallback>
+  </mc:AlternateContent>
+  <p:timing>
+    <p:tnLst>
+      <p:par>
+        <p:cTn id="1" dur="indefinite" restart="never" nodeType="tmRoot"/>
+      </p:par>
+    </p:tnLst>
+  </p:timing>
 </p:sld>
 </file>
 
@@ -23976,6 +24048,25 @@
   <p:clrMapOvr>
     <a:masterClrMapping/>
   </p:clrMapOvr>
+  <mc:AlternateContent xmlns:mc="http://schemas.openxmlformats.org/markup-compatibility/2006">
+    <mc:Choice xmlns:p14="http://schemas.microsoft.com/office/powerpoint/2010/main" Requires="p14">
+      <p:transition spd="slow" p14:dur="4400">
+        <p14:honeycomb/>
+      </p:transition>
+    </mc:Choice>
+    <mc:Fallback>
+      <p:transition spd="slow">
+        <p:fade/>
+      </p:transition>
+    </mc:Fallback>
+  </mc:AlternateContent>
+  <p:timing>
+    <p:tnLst>
+      <p:par>
+        <p:cTn id="1" dur="indefinite" restart="never" nodeType="tmRoot"/>
+      </p:par>
+    </p:tnLst>
+  </p:timing>
 </p:sld>
 </file>
 
@@ -24138,7 +24229,7 @@
                 <a16:creationId xmlns:a16="http://schemas.microsoft.com/office/drawing/2014/main" id="{8186FEAF-6E1E-4258-94C3-5C589D4B5ADE}"/>
               </a:ext>
               <a:ext uri="{C183D7F6-B498-43B3-948B-1728B52AA6E4}">
-                <adec:decorative xmlns:adec="http://schemas.microsoft.com/office/drawing/2017/decorative" xmlns="" val="1"/>
+                <adec:decorative xmlns="" xmlns:adec="http://schemas.microsoft.com/office/drawing/2017/decorative" val="1"/>
               </a:ext>
             </a:extLst>
           </p:cNvPr>
@@ -24399,7 +24490,7 @@
                 <a16:creationId xmlns:a16="http://schemas.microsoft.com/office/drawing/2014/main" id="{0D74D4D5-6A4C-4248-8A92-B8CA1C918EB6}"/>
               </a:ext>
               <a:ext uri="{C183D7F6-B498-43B3-948B-1728B52AA6E4}">
-                <adec:decorative xmlns:adec="http://schemas.microsoft.com/office/drawing/2017/decorative" xmlns="" val="1"/>
+                <adec:decorative xmlns="" xmlns:adec="http://schemas.microsoft.com/office/drawing/2017/decorative" val="1"/>
               </a:ext>
             </a:extLst>
           </p:cNvPr>
@@ -24588,6 +24679,25 @@
   <p:clrMapOvr>
     <a:masterClrMapping/>
   </p:clrMapOvr>
+  <mc:AlternateContent xmlns:mc="http://schemas.openxmlformats.org/markup-compatibility/2006">
+    <mc:Choice xmlns:p14="http://schemas.microsoft.com/office/powerpoint/2010/main" Requires="p14">
+      <p:transition spd="slow" p14:dur="4400">
+        <p14:honeycomb/>
+      </p:transition>
+    </mc:Choice>
+    <mc:Fallback>
+      <p:transition spd="slow">
+        <p:fade/>
+      </p:transition>
+    </mc:Fallback>
+  </mc:AlternateContent>
+  <p:timing>
+    <p:tnLst>
+      <p:par>
+        <p:cTn id="1" dur="indefinite" restart="never" nodeType="tmRoot"/>
+      </p:par>
+    </p:tnLst>
+  </p:timing>
 </p:sld>
 </file>
 
@@ -24681,7 +24791,7 @@
                 <a16:creationId xmlns:a16="http://schemas.microsoft.com/office/drawing/2014/main" id="{8186FEAF-6E1E-4258-94C3-5C589D4B5ADE}"/>
               </a:ext>
               <a:ext uri="{C183D7F6-B498-43B3-948B-1728B52AA6E4}">
-                <adec:decorative xmlns:adec="http://schemas.microsoft.com/office/drawing/2017/decorative" xmlns="" val="1"/>
+                <adec:decorative xmlns="" xmlns:adec="http://schemas.microsoft.com/office/drawing/2017/decorative" val="1"/>
               </a:ext>
             </a:extLst>
           </p:cNvPr>
@@ -24872,6 +24982,25 @@
   <p:clrMapOvr>
     <a:masterClrMapping/>
   </p:clrMapOvr>
+  <mc:AlternateContent xmlns:mc="http://schemas.openxmlformats.org/markup-compatibility/2006">
+    <mc:Choice xmlns:p14="http://schemas.microsoft.com/office/powerpoint/2010/main" Requires="p14">
+      <p:transition spd="slow" p14:dur="4400">
+        <p14:honeycomb/>
+      </p:transition>
+    </mc:Choice>
+    <mc:Fallback>
+      <p:transition spd="slow">
+        <p:fade/>
+      </p:transition>
+    </mc:Fallback>
+  </mc:AlternateContent>
+  <p:timing>
+    <p:tnLst>
+      <p:par>
+        <p:cTn id="1" dur="indefinite" restart="never" nodeType="tmRoot"/>
+      </p:par>
+    </p:tnLst>
+  </p:timing>
 </p:sld>
 </file>
 
@@ -24936,7 +25065,7 @@
                 <a16:creationId xmlns:a16="http://schemas.microsoft.com/office/drawing/2014/main" id="{B231FB9C-F234-41D0-A4CE-8C29A5F2F553}"/>
               </a:ext>
               <a:ext uri="{C183D7F6-B498-43B3-948B-1728B52AA6E4}">
-                <adec:decorative xmlns:adec="http://schemas.microsoft.com/office/drawing/2017/decorative" xmlns="" val="1"/>
+                <adec:decorative xmlns="" xmlns:adec="http://schemas.microsoft.com/office/drawing/2017/decorative" val="1"/>
               </a:ext>
             </a:extLst>
           </p:cNvPr>
@@ -25085,7 +25214,7 @@
                 <a16:creationId xmlns:a16="http://schemas.microsoft.com/office/drawing/2014/main" id="{FE193317-B8BD-46CA-B0A6-8A7511B086D9}"/>
               </a:ext>
               <a:ext uri="{C183D7F6-B498-43B3-948B-1728B52AA6E4}">
-                <adec:decorative xmlns:adec="http://schemas.microsoft.com/office/drawing/2017/decorative" xmlns="" val="1"/>
+                <adec:decorative xmlns="" xmlns:adec="http://schemas.microsoft.com/office/drawing/2017/decorative" val="1"/>
               </a:ext>
             </a:extLst>
           </p:cNvPr>
@@ -25147,7 +25276,7 @@
                 <a16:creationId xmlns:a16="http://schemas.microsoft.com/office/drawing/2014/main" id="{85E0D4E1-E389-4671-B0E7-165A10A05425}"/>
               </a:ext>
               <a:ext uri="{C183D7F6-B498-43B3-948B-1728B52AA6E4}">
-                <adec:decorative xmlns:adec="http://schemas.microsoft.com/office/drawing/2017/decorative" xmlns="" val="1"/>
+                <adec:decorative xmlns="" xmlns:adec="http://schemas.microsoft.com/office/drawing/2017/decorative" val="1"/>
               </a:ext>
             </a:extLst>
           </p:cNvPr>
@@ -25336,7 +25465,7 @@
                 <a16:creationId xmlns:a16="http://schemas.microsoft.com/office/drawing/2014/main" id="{8186FEAF-6E1E-4258-94C3-5C589D4B5ADE}"/>
               </a:ext>
               <a:ext uri="{C183D7F6-B498-43B3-948B-1728B52AA6E4}">
-                <adec:decorative xmlns:adec="http://schemas.microsoft.com/office/drawing/2017/decorative" xmlns="" val="1"/>
+                <adec:decorative xmlns="" xmlns:adec="http://schemas.microsoft.com/office/drawing/2017/decorative" val="1"/>
               </a:ext>
             </a:extLst>
           </p:cNvPr>
@@ -25567,7 +25696,7 @@
                 <a14:useLocalDpi xmlns:a14="http://schemas.microsoft.com/office/drawing/2010/main"/>
               </a:ext>
               <a:ext uri="{96DAC541-7B7A-43D3-8B79-37D633B846F1}">
-                <asvg:svgBlip xmlns:asvg="http://schemas.microsoft.com/office/drawing/2016/SVG/main" xmlns="" r:embed="rId4"/>
+                <asvg:svgBlip xmlns="" xmlns:asvg="http://schemas.microsoft.com/office/drawing/2016/SVG/main" r:embed="rId4"/>
               </a:ext>
             </a:extLst>
           </a:blip>
@@ -25639,7 +25768,7 @@
                 <a14:useLocalDpi xmlns:a14="http://schemas.microsoft.com/office/drawing/2010/main"/>
               </a:ext>
               <a:ext uri="{96DAC541-7B7A-43D3-8B79-37D633B846F1}">
-                <asvg:svgBlip xmlns:asvg="http://schemas.microsoft.com/office/drawing/2016/SVG/main" xmlns="" r:embed="rId4"/>
+                <asvg:svgBlip xmlns="" xmlns:asvg="http://schemas.microsoft.com/office/drawing/2016/SVG/main" r:embed="rId4"/>
               </a:ext>
             </a:extLst>
           </a:blip>
@@ -25705,6 +25834,25 @@
   <p:clrMapOvr>
     <a:masterClrMapping/>
   </p:clrMapOvr>
+  <mc:AlternateContent xmlns:mc="http://schemas.openxmlformats.org/markup-compatibility/2006">
+    <mc:Choice xmlns:p14="http://schemas.microsoft.com/office/powerpoint/2010/main" Requires="p14">
+      <p:transition spd="slow" p14:dur="4400">
+        <p14:honeycomb/>
+      </p:transition>
+    </mc:Choice>
+    <mc:Fallback>
+      <p:transition spd="slow">
+        <p:fade/>
+      </p:transition>
+    </mc:Fallback>
+  </mc:AlternateContent>
+  <p:timing>
+    <p:tnLst>
+      <p:par>
+        <p:cTn id="1" dur="indefinite" restart="never" nodeType="tmRoot"/>
+      </p:par>
+    </p:tnLst>
+  </p:timing>
 </p:sld>
 </file>
 

</xml_diff>